<commit_message>
inclusion of Blackboard Link
</commit_message>
<xml_diff>
--- a/Board Design In Autodesk Eagle.pptx
+++ b/Board Design In Autodesk Eagle.pptx
@@ -5,10 +5,11 @@
     <p:sldMasterId id="2147483660" r:id="rId1"/>
   </p:sldMasterIdLst>
   <p:notesMasterIdLst>
-    <p:notesMasterId r:id="rId3"/>
+    <p:notesMasterId r:id="rId4"/>
   </p:notesMasterIdLst>
   <p:sldIdLst>
     <p:sldId id="279" r:id="rId2"/>
+    <p:sldId id="280" r:id="rId3"/>
   </p:sldIdLst>
   <p:sldSz cx="12192000" cy="6858000"/>
   <p:notesSz cx="6858000" cy="9144000"/>
@@ -107,6 +108,11 @@
       </a:defRPr>
     </a:lvl9pPr>
   </p:defaultTextStyle>
+  <p:extLst>
+    <p:ext uri="{EFAFB233-063F-42B5-8137-9DF3F51BA10A}">
+      <p15:sldGuideLst xmlns:p15="http://schemas.microsoft.com/office/powerpoint/2012/main"/>
+    </p:ext>
+  </p:extLst>
 </p:presentation>
 </file>
 
@@ -192,7 +198,7 @@
           <a:p>
             <a:fld id="{1EAE4641-1720-4D61-9178-76283309EC43}" type="datetimeFigureOut">
               <a:rPr lang="en-GB" smtClean="0"/>
-              <a:t>16/12/2020</a:t>
+              <a:t>24/12/2020</a:t>
             </a:fld>
             <a:endParaRPr lang="en-GB"/>
           </a:p>
@@ -1128,7 +1134,7 @@
           <a:p>
             <a:fld id="{D6D0F569-AC90-44EB-9EF4-4E5C2F5D823C}" type="datetime1">
               <a:rPr lang="en-US" smtClean="0"/>
-              <a:t>12/16/2020</a:t>
+              <a:t>12/24/2020</a:t>
             </a:fld>
             <a:endParaRPr lang="en-US" dirty="0"/>
           </a:p>
@@ -1805,7 +1811,7 @@
           <a:p>
             <a:fld id="{46BA7D41-E8B7-4A0B-B861-3EC4AE88917D}" type="datetime1">
               <a:rPr lang="en-US" smtClean="0"/>
-              <a:t>12/16/2020</a:t>
+              <a:t>12/24/2020</a:t>
             </a:fld>
             <a:endParaRPr lang="en-US" dirty="0"/>
           </a:p>
@@ -2492,7 +2498,7 @@
           <a:p>
             <a:fld id="{A7C34823-0B19-4B4E-A643-7A3B0A3D24D6}" type="datetime1">
               <a:rPr lang="en-US" smtClean="0"/>
-              <a:t>12/16/2020</a:t>
+              <a:t>12/24/2020</a:t>
             </a:fld>
             <a:endParaRPr lang="en-US" dirty="0"/>
           </a:p>
@@ -3172,7 +3178,7 @@
           <a:p>
             <a:fld id="{8C2D79EF-17C8-45D8-9866-DAF5723FC604}" type="datetime1">
               <a:rPr lang="en-US" smtClean="0"/>
-              <a:t>12/16/2020</a:t>
+              <a:t>12/24/2020</a:t>
             </a:fld>
             <a:endParaRPr lang="en-US" dirty="0"/>
           </a:p>
@@ -3926,7 +3932,7 @@
           <a:p>
             <a:fld id="{DFFC2ADC-3680-4013-A757-E4663495DB98}" type="datetime1">
               <a:rPr lang="en-US" smtClean="0"/>
-              <a:t>12/16/2020</a:t>
+              <a:t>12/24/2020</a:t>
             </a:fld>
             <a:endParaRPr lang="en-US" dirty="0"/>
           </a:p>
@@ -4670,7 +4676,7 @@
           <a:p>
             <a:fld id="{4751BA94-5DCA-4F19-960F-0FB2BD5EE85A}" type="datetime1">
               <a:rPr lang="en-US" smtClean="0"/>
-              <a:t>12/16/2020</a:t>
+              <a:t>12/24/2020</a:t>
             </a:fld>
             <a:endParaRPr lang="en-US" dirty="0"/>
           </a:p>
@@ -5561,7 +5567,7 @@
           <a:p>
             <a:fld id="{01BED947-38D9-44AC-8B89-E79758333B77}" type="datetime1">
               <a:rPr lang="en-US" smtClean="0"/>
-              <a:t>12/16/2020</a:t>
+              <a:t>12/24/2020</a:t>
             </a:fld>
             <a:endParaRPr lang="en-US" dirty="0"/>
           </a:p>
@@ -6181,7 +6187,7 @@
           <a:p>
             <a:fld id="{3781E23F-BD3C-4F23-B116-2B758120C8AC}" type="datetime1">
               <a:rPr lang="en-US" smtClean="0"/>
-              <a:t>12/16/2020</a:t>
+              <a:t>12/24/2020</a:t>
             </a:fld>
             <a:endParaRPr lang="en-US" dirty="0"/>
           </a:p>
@@ -6773,7 +6779,7 @@
           <a:p>
             <a:fld id="{473CFAA9-6D59-4D98-869E-ACBDB83B2CA4}" type="datetime1">
               <a:rPr lang="en-US" smtClean="0"/>
-              <a:t>12/16/2020</a:t>
+              <a:t>12/24/2020</a:t>
             </a:fld>
             <a:endParaRPr lang="en-US"/>
           </a:p>
@@ -7563,7 +7569,7 @@
           <a:p>
             <a:fld id="{DC410804-27E3-430A-BB42-B831260DE39A}" type="datetime1">
               <a:rPr lang="en-US" smtClean="0"/>
-              <a:t>12/16/2020</a:t>
+              <a:t>12/24/2020</a:t>
             </a:fld>
             <a:endParaRPr lang="en-US" dirty="0"/>
           </a:p>
@@ -8333,7 +8339,7 @@
           <a:p>
             <a:fld id="{60E22DE3-3D1A-4D53-B9A6-6C7463B8C992}" type="datetime1">
               <a:rPr lang="en-US" smtClean="0"/>
-              <a:t>12/16/2020</a:t>
+              <a:t>12/24/2020</a:t>
             </a:fld>
             <a:endParaRPr lang="en-US" dirty="0"/>
           </a:p>
@@ -8642,7 +8648,7 @@
             <a:fld id="{5ECD8B30-1B71-45A1-8314-D59C86F581E1}" type="datetime1">
               <a:rPr lang="en-US" smtClean="0"/>
               <a:pPr/>
-              <a:t>12/16/2020</a:t>
+              <a:t>12/24/2020</a:t>
             </a:fld>
             <a:endParaRPr lang="en-US" b="1" dirty="0"/>
           </a:p>
@@ -9395,6 +9401,97 @@
         </p:txBody>
       </p:sp>
     </p:spTree>
+  </p:cSld>
+  <p:clrMapOvr>
+    <a:masterClrMapping/>
+  </p:clrMapOvr>
+</p:sld>
+</file>
+
+<file path=ppt/slides/slide2.xml><?xml version="1.0" encoding="utf-8"?>
+<p:sld xmlns:a="http://schemas.openxmlformats.org/drawingml/2006/main" xmlns:r="http://schemas.openxmlformats.org/officeDocument/2006/relationships" xmlns:p="http://schemas.openxmlformats.org/presentationml/2006/main">
+  <p:cSld>
+    <p:spTree>
+      <p:nvGrpSpPr>
+        <p:cNvPr id="1" name=""/>
+        <p:cNvGrpSpPr/>
+        <p:nvPr/>
+      </p:nvGrpSpPr>
+      <p:grpSpPr>
+        <a:xfrm>
+          <a:off x="0" y="0"/>
+          <a:ext cx="0" cy="0"/>
+          <a:chOff x="0" y="0"/>
+          <a:chExt cx="0" cy="0"/>
+        </a:xfrm>
+      </p:grpSpPr>
+      <p:sp>
+        <p:nvSpPr>
+          <p:cNvPr id="2" name="Title 1">
+            <a:extLst>
+              <a:ext uri="{FF2B5EF4-FFF2-40B4-BE49-F238E27FC236}">
+                <a16:creationId xmlns:a16="http://schemas.microsoft.com/office/drawing/2014/main" id="{1A425071-749B-45ED-A5EC-2FC40CB92CE6}"/>
+              </a:ext>
+            </a:extLst>
+          </p:cNvPr>
+          <p:cNvSpPr>
+            <a:spLocks noGrp="1"/>
+          </p:cNvSpPr>
+          <p:nvPr>
+            <p:ph type="title"/>
+          </p:nvPr>
+        </p:nvSpPr>
+        <p:spPr/>
+        <p:txBody>
+          <a:bodyPr/>
+          <a:lstStyle/>
+          <a:p>
+            <a:r>
+              <a:rPr lang="en-GB" dirty="0"/>
+              <a:t>Lesson Video Link</a:t>
+            </a:r>
+          </a:p>
+        </p:txBody>
+      </p:sp>
+      <p:sp>
+        <p:nvSpPr>
+          <p:cNvPr id="3" name="Content Placeholder 2">
+            <a:extLst>
+              <a:ext uri="{FF2B5EF4-FFF2-40B4-BE49-F238E27FC236}">
+                <a16:creationId xmlns:a16="http://schemas.microsoft.com/office/drawing/2014/main" id="{09D7762B-3518-46BF-8280-D592DBD530F1}"/>
+              </a:ext>
+            </a:extLst>
+          </p:cNvPr>
+          <p:cNvSpPr>
+            <a:spLocks noGrp="1"/>
+          </p:cNvSpPr>
+          <p:nvPr>
+            <p:ph idx="1"/>
+          </p:nvPr>
+        </p:nvSpPr>
+        <p:spPr>
+          <a:xfrm>
+            <a:off x="838200" y="1825625"/>
+            <a:ext cx="10515600" cy="1169245"/>
+          </a:xfrm>
+        </p:spPr>
+        <p:txBody>
+          <a:bodyPr/>
+          <a:lstStyle/>
+          <a:p>
+            <a:r>
+              <a:rPr lang="en-GB" dirty="0"/>
+              <a:t>https://eu-lti.bbcollab.com/recording/3eba6015ec1b4492b52a514fc9174600</a:t>
+            </a:r>
+          </a:p>
+        </p:txBody>
+      </p:sp>
+    </p:spTree>
+    <p:extLst>
+      <p:ext uri="{BB962C8B-B14F-4D97-AF65-F5344CB8AC3E}">
+        <p14:creationId xmlns:p14="http://schemas.microsoft.com/office/powerpoint/2010/main" val="2428788689"/>
+      </p:ext>
+    </p:extLst>
   </p:cSld>
   <p:clrMapOvr>
     <a:masterClrMapping/>

</xml_diff>